<commit_message>
PowerPoint - Week 2
</commit_message>
<xml_diff>
--- a/01. Week 1/00. Presentation/Week 1.pptx
+++ b/01. Week 1/00. Presentation/Week 1.pptx
@@ -46,9 +46,12 @@
     <p:sldId id="295" r:id="rId40"/>
     <p:sldId id="296" r:id="rId41"/>
     <p:sldId id="297" r:id="rId42"/>
-    <p:sldId id="298" r:id="rId43"/>
-    <p:sldId id="299" r:id="rId44"/>
-    <p:sldId id="300" r:id="rId45"/>
+    <p:sldId id="301" r:id="rId43"/>
+    <p:sldId id="302" r:id="rId44"/>
+    <p:sldId id="298" r:id="rId45"/>
+    <p:sldId id="299" r:id="rId46"/>
+    <p:sldId id="300" r:id="rId47"/>
+    <p:sldId id="303" r:id="rId48"/>
   </p:sldIdLst>
   <p:sldSz cx="9144000" cy="6858000" type="screen4x3"/>
   <p:notesSz cx="6858000" cy="9144000"/>
@@ -331,7 +334,7 @@
           <a:p>
             <a:fld id="{713DCFBF-1251-4F71-8BFB-150CFD910DA2}" type="datetimeFigureOut">
               <a:rPr lang="en-US" smtClean="0"/>
-              <a:t>1/21/2018</a:t>
+              <a:t>1/22/2018</a:t>
             </a:fld>
             <a:endParaRPr lang="en-US"/>
           </a:p>
@@ -501,7 +504,7 @@
           <a:p>
             <a:fld id="{713DCFBF-1251-4F71-8BFB-150CFD910DA2}" type="datetimeFigureOut">
               <a:rPr lang="en-US" smtClean="0"/>
-              <a:t>1/21/2018</a:t>
+              <a:t>1/22/2018</a:t>
             </a:fld>
             <a:endParaRPr lang="en-US"/>
           </a:p>
@@ -681,7 +684,7 @@
           <a:p>
             <a:fld id="{713DCFBF-1251-4F71-8BFB-150CFD910DA2}" type="datetimeFigureOut">
               <a:rPr lang="en-US" smtClean="0"/>
-              <a:t>1/21/2018</a:t>
+              <a:t>1/22/2018</a:t>
             </a:fld>
             <a:endParaRPr lang="en-US"/>
           </a:p>
@@ -851,7 +854,7 @@
           <a:p>
             <a:fld id="{713DCFBF-1251-4F71-8BFB-150CFD910DA2}" type="datetimeFigureOut">
               <a:rPr lang="en-US" smtClean="0"/>
-              <a:t>1/21/2018</a:t>
+              <a:t>1/22/2018</a:t>
             </a:fld>
             <a:endParaRPr lang="en-US"/>
           </a:p>
@@ -1097,7 +1100,7 @@
           <a:p>
             <a:fld id="{713DCFBF-1251-4F71-8BFB-150CFD910DA2}" type="datetimeFigureOut">
               <a:rPr lang="en-US" smtClean="0"/>
-              <a:t>1/21/2018</a:t>
+              <a:t>1/22/2018</a:t>
             </a:fld>
             <a:endParaRPr lang="en-US"/>
           </a:p>
@@ -1385,7 +1388,7 @@
           <a:p>
             <a:fld id="{713DCFBF-1251-4F71-8BFB-150CFD910DA2}" type="datetimeFigureOut">
               <a:rPr lang="en-US" smtClean="0"/>
-              <a:t>1/21/2018</a:t>
+              <a:t>1/22/2018</a:t>
             </a:fld>
             <a:endParaRPr lang="en-US"/>
           </a:p>
@@ -1807,7 +1810,7 @@
           <a:p>
             <a:fld id="{713DCFBF-1251-4F71-8BFB-150CFD910DA2}" type="datetimeFigureOut">
               <a:rPr lang="en-US" smtClean="0"/>
-              <a:t>1/21/2018</a:t>
+              <a:t>1/22/2018</a:t>
             </a:fld>
             <a:endParaRPr lang="en-US"/>
           </a:p>
@@ -1925,7 +1928,7 @@
           <a:p>
             <a:fld id="{713DCFBF-1251-4F71-8BFB-150CFD910DA2}" type="datetimeFigureOut">
               <a:rPr lang="en-US" smtClean="0"/>
-              <a:t>1/21/2018</a:t>
+              <a:t>1/22/2018</a:t>
             </a:fld>
             <a:endParaRPr lang="en-US"/>
           </a:p>
@@ -2020,7 +2023,7 @@
           <a:p>
             <a:fld id="{713DCFBF-1251-4F71-8BFB-150CFD910DA2}" type="datetimeFigureOut">
               <a:rPr lang="en-US" smtClean="0"/>
-              <a:t>1/21/2018</a:t>
+              <a:t>1/22/2018</a:t>
             </a:fld>
             <a:endParaRPr lang="en-US"/>
           </a:p>
@@ -2297,7 +2300,7 @@
           <a:p>
             <a:fld id="{713DCFBF-1251-4F71-8BFB-150CFD910DA2}" type="datetimeFigureOut">
               <a:rPr lang="en-US" smtClean="0"/>
-              <a:t>1/21/2018</a:t>
+              <a:t>1/22/2018</a:t>
             </a:fld>
             <a:endParaRPr lang="en-US"/>
           </a:p>
@@ -2550,7 +2553,7 @@
           <a:p>
             <a:fld id="{713DCFBF-1251-4F71-8BFB-150CFD910DA2}" type="datetimeFigureOut">
               <a:rPr lang="en-US" smtClean="0"/>
-              <a:t>1/21/2018</a:t>
+              <a:t>1/22/2018</a:t>
             </a:fld>
             <a:endParaRPr lang="en-US"/>
           </a:p>
@@ -2763,7 +2766,7 @@
           <a:p>
             <a:fld id="{713DCFBF-1251-4F71-8BFB-150CFD910DA2}" type="datetimeFigureOut">
               <a:rPr lang="en-US" smtClean="0"/>
-              <a:t>1/21/2018</a:t>
+              <a:t>1/22/2018</a:t>
             </a:fld>
             <a:endParaRPr lang="en-US"/>
           </a:p>
@@ -6076,13 +6079,6 @@
               </a:rPr>
               <a:t>HTML</a:t>
             </a:r>
-            <a:endParaRPr lang="en-US" sz="9600" dirty="0" smtClean="0">
-              <a:solidFill>
-                <a:schemeClr val="accent6">
-                  <a:lumMod val="75000"/>
-                </a:schemeClr>
-              </a:solidFill>
-            </a:endParaRPr>
           </a:p>
         </p:txBody>
       </p:sp>
@@ -6150,7 +6146,6 @@
               <a:rPr lang="en-US" sz="8800" dirty="0" smtClean="0"/>
               <a:t>Tables</a:t>
             </a:r>
-            <a:endParaRPr lang="en-US" sz="8800" dirty="0" smtClean="0"/>
           </a:p>
           <a:p>
             <a:pPr algn="ctr"/>
@@ -6192,29 +6187,8 @@
                   <a:srgbClr val="00B0F0"/>
                 </a:solidFill>
               </a:rPr>
-              <a:t>&gt;&lt;</a:t>
-            </a:r>
-            <a:r>
-              <a:rPr lang="en-US" sz="5400" dirty="0" smtClean="0">
-                <a:solidFill>
-                  <a:srgbClr val="00B0F0"/>
-                </a:solidFill>
-              </a:rPr>
-              <a:t>/table</a:t>
-            </a:r>
-            <a:r>
-              <a:rPr lang="en-US" sz="5400" dirty="0" smtClean="0">
-                <a:solidFill>
-                  <a:srgbClr val="00B0F0"/>
-                </a:solidFill>
-              </a:rPr>
-              <a:t>&gt;</a:t>
-            </a:r>
-            <a:endParaRPr lang="en-US" sz="5400" dirty="0" smtClean="0">
-              <a:solidFill>
-                <a:srgbClr val="00B0F0"/>
-              </a:solidFill>
-            </a:endParaRPr>
+              <a:t>&gt;&lt;/table&gt;</a:t>
+            </a:r>
           </a:p>
           <a:p>
             <a:pPr algn="ctr"/>
@@ -6449,7 +6423,6 @@
               <a:rPr lang="en-US" sz="8800" dirty="0" smtClean="0"/>
               <a:t>Forms</a:t>
             </a:r>
-            <a:endParaRPr lang="en-US" sz="8800" dirty="0" smtClean="0"/>
           </a:p>
           <a:p>
             <a:pPr algn="ctr"/>
@@ -6459,51 +6432,30 @@
                   <a:srgbClr val="00B0F0"/>
                 </a:solidFill>
               </a:rPr>
-              <a:t>&lt;form&gt;…&lt;/</a:t>
-            </a:r>
+              <a:t>&lt;form&gt;…&lt;/form&gt;</a:t>
+            </a:r>
+          </a:p>
+          <a:p>
+            <a:pPr algn="ctr"/>
             <a:r>
               <a:rPr lang="en-US" sz="5400" dirty="0" smtClean="0">
                 <a:solidFill>
                   <a:srgbClr val="00B0F0"/>
                 </a:solidFill>
               </a:rPr>
-              <a:t>form</a:t>
-            </a:r>
+              <a:t>&lt;input&gt;</a:t>
+            </a:r>
+          </a:p>
+          <a:p>
+            <a:pPr algn="ctr"/>
             <a:r>
               <a:rPr lang="en-US" sz="5400" dirty="0" smtClean="0">
                 <a:solidFill>
                   <a:srgbClr val="00B0F0"/>
                 </a:solidFill>
               </a:rPr>
-              <a:t>&gt;</a:t>
-            </a:r>
-          </a:p>
-          <a:p>
-            <a:pPr algn="ctr"/>
-            <a:r>
-              <a:rPr lang="en-US" sz="5400" dirty="0" smtClean="0">
-                <a:solidFill>
-                  <a:srgbClr val="00B0F0"/>
-                </a:solidFill>
-              </a:rPr>
-              <a:t>&lt;input&gt;</a:t>
-            </a:r>
-          </a:p>
-          <a:p>
-            <a:pPr algn="ctr"/>
-            <a:r>
-              <a:rPr lang="en-US" sz="5400" dirty="0" smtClean="0">
-                <a:solidFill>
-                  <a:srgbClr val="00B0F0"/>
-                </a:solidFill>
-              </a:rPr>
               <a:t>&lt;label&gt; … &lt;/label&gt;</a:t>
             </a:r>
-            <a:endParaRPr lang="en-US" sz="5400" dirty="0" smtClean="0">
-              <a:solidFill>
-                <a:srgbClr val="00B0F0"/>
-              </a:solidFill>
-            </a:endParaRPr>
           </a:p>
         </p:txBody>
       </p:sp>
@@ -6702,8 +6654,8 @@
         </p:nvSpPr>
         <p:spPr>
           <a:xfrm>
-            <a:off x="304800" y="1768257"/>
-            <a:ext cx="8534400" cy="3108543"/>
+            <a:off x="304800" y="1639193"/>
+            <a:ext cx="8534400" cy="3847207"/>
           </a:xfrm>
           <a:prstGeom prst="rect">
             <a:avLst/>
@@ -6733,17 +6685,24 @@
               <a:rPr lang="en-US" sz="8800" dirty="0" smtClean="0"/>
               <a:t>tag</a:t>
             </a:r>
-            <a:endParaRPr lang="en-US" sz="8800" dirty="0" smtClean="0"/>
-          </a:p>
-          <a:p>
-            <a:pPr algn="ctr"/>
+          </a:p>
+          <a:p>
+            <a:pPr algn="ctr"/>
+            <a:r>
+              <a:rPr lang="en-US" sz="5400" dirty="0">
+                <a:solidFill>
+                  <a:srgbClr val="FFFF00"/>
+                </a:solidFill>
+              </a:rPr>
+              <a:t>b</a:t>
+            </a:r>
             <a:r>
               <a:rPr lang="en-US" sz="5400" dirty="0" smtClean="0">
                 <a:solidFill>
                   <a:srgbClr val="FFFF00"/>
                 </a:solidFill>
               </a:rPr>
-              <a:t>text, email, password, date</a:t>
+              <a:t>utton, text, radio, </a:t>
             </a:r>
           </a:p>
           <a:p>
@@ -6754,13 +6713,16 @@
                   <a:srgbClr val="FFFF00"/>
                 </a:solidFill>
               </a:rPr>
-              <a:t>and more…</a:t>
-            </a:r>
-            <a:endParaRPr lang="en-US" sz="5400" dirty="0" smtClean="0">
-              <a:solidFill>
-                <a:srgbClr val="FFFF00"/>
-              </a:solidFill>
-            </a:endParaRPr>
+              <a:t>checkbox, </a:t>
+            </a:r>
+            <a:r>
+              <a:rPr lang="en-US" sz="4800" dirty="0" smtClean="0">
+                <a:solidFill>
+                  <a:srgbClr val="FFFF00"/>
+                </a:solidFill>
+              </a:rPr>
+              <a:t>submit, password, file, hidden, reset</a:t>
+            </a:r>
           </a:p>
         </p:txBody>
       </p:sp>
@@ -6809,8 +6771,8 @@
         </p:nvSpPr>
         <p:spPr>
           <a:xfrm>
-            <a:off x="762000" y="2438400"/>
-            <a:ext cx="7620000" cy="1862048"/>
+            <a:off x="304800" y="1066800"/>
+            <a:ext cx="8534400" cy="4770537"/>
           </a:xfrm>
           <a:prstGeom prst="rect">
             <a:avLst/>
@@ -6825,25 +6787,92 @@
           <a:p>
             <a:pPr algn="ctr"/>
             <a:r>
-              <a:rPr lang="en-US" sz="11500" dirty="0" smtClean="0">
+              <a:rPr lang="en-US" sz="8000" dirty="0" smtClean="0"/>
+              <a:t>Notable Additions</a:t>
+            </a:r>
+          </a:p>
+          <a:p>
+            <a:pPr algn="ctr"/>
+            <a:r>
+              <a:rPr lang="en-US" sz="5400" dirty="0" smtClean="0">
                 <a:solidFill>
                   <a:srgbClr val="FFFF00"/>
                 </a:solidFill>
               </a:rPr>
-              <a:t>DEMO</a:t>
-            </a:r>
-            <a:endParaRPr lang="en-US" sz="4800" dirty="0" smtClean="0">
-              <a:solidFill>
-                <a:srgbClr val="FFFF00"/>
-              </a:solidFill>
-            </a:endParaRPr>
+              <a:t>email, </a:t>
+            </a:r>
+            <a:r>
+              <a:rPr lang="en-US" sz="5400" dirty="0" err="1" smtClean="0">
+                <a:solidFill>
+                  <a:srgbClr val="FFFF00"/>
+                </a:solidFill>
+              </a:rPr>
+              <a:t>url</a:t>
+            </a:r>
+            <a:r>
+              <a:rPr lang="en-US" sz="5400" dirty="0" smtClean="0">
+                <a:solidFill>
+                  <a:srgbClr val="FFFF00"/>
+                </a:solidFill>
+              </a:rPr>
+              <a:t>, color, </a:t>
+            </a:r>
+          </a:p>
+          <a:p>
+            <a:pPr algn="ctr"/>
+            <a:r>
+              <a:rPr lang="en-US" sz="5400" dirty="0" smtClean="0">
+                <a:solidFill>
+                  <a:srgbClr val="FFFF00"/>
+                </a:solidFill>
+              </a:rPr>
+              <a:t>date, </a:t>
+            </a:r>
+            <a:r>
+              <a:rPr lang="en-US" sz="5400" dirty="0" err="1" smtClean="0">
+                <a:solidFill>
+                  <a:srgbClr val="FFFF00"/>
+                </a:solidFill>
+              </a:rPr>
+              <a:t>datetime</a:t>
+            </a:r>
+            <a:r>
+              <a:rPr lang="en-US" sz="5400" dirty="0" smtClean="0">
+                <a:solidFill>
+                  <a:srgbClr val="FFFF00"/>
+                </a:solidFill>
+              </a:rPr>
+              <a:t>,</a:t>
+            </a:r>
+          </a:p>
+          <a:p>
+            <a:pPr algn="ctr"/>
+            <a:r>
+              <a:rPr lang="en-US" sz="5400" dirty="0" smtClean="0">
+                <a:solidFill>
+                  <a:srgbClr val="FFFF00"/>
+                </a:solidFill>
+              </a:rPr>
+              <a:t>time, month,</a:t>
+            </a:r>
+          </a:p>
+          <a:p>
+            <a:pPr algn="ctr"/>
+            <a:r>
+              <a:rPr lang="en-US" sz="5400" dirty="0" smtClean="0">
+                <a:solidFill>
+                  <a:srgbClr val="FFFF00"/>
+                </a:solidFill>
+              </a:rPr>
+              <a:t>number, range</a:t>
+            </a:r>
           </a:p>
         </p:txBody>
       </p:sp>
     </p:spTree>
     <p:extLst>
       <p:ext uri="{BB962C8B-B14F-4D97-AF65-F5344CB8AC3E}">
-        <p14:creationId xmlns:p14="http://schemas.microsoft.com/office/powerpoint/2010/main" val="372412916"/>
+        <p14:creationId xmlns:p14="http://schemas.microsoft.com/office/powerpoint/2010/main" val="3107818693"/>
       </p:ext>
     </p:extLst>
   </p:cSld>
@@ -6885,8 +6914,8 @@
         </p:nvSpPr>
         <p:spPr>
           <a:xfrm>
-            <a:off x="304800" y="2744450"/>
-            <a:ext cx="8534400" cy="1446550"/>
+            <a:off x="762000" y="1066800"/>
+            <a:ext cx="7620000" cy="4524315"/>
           </a:xfrm>
           <a:prstGeom prst="rect">
             <a:avLst/>
@@ -6901,29 +6930,68 @@
           <a:p>
             <a:pPr algn="ctr"/>
             <a:r>
-              <a:rPr lang="en-US" sz="8800" dirty="0" smtClean="0"/>
-              <a:t>The </a:t>
-            </a:r>
-            <a:r>
-              <a:rPr lang="en-US" sz="8800" dirty="0" smtClean="0">
+              <a:rPr lang="en-US" sz="7200" dirty="0" smtClean="0"/>
+              <a:t>Non </a:t>
+            </a:r>
+            <a:r>
+              <a:rPr lang="en-US" sz="7200" dirty="0">
                 <a:solidFill>
                   <a:srgbClr val="00B0F0"/>
                 </a:solidFill>
               </a:rPr>
-              <a:t>&lt;label&gt; </a:t>
-            </a:r>
-            <a:r>
-              <a:rPr lang="en-US" sz="8800" dirty="0" smtClean="0"/>
+              <a:t>&lt;input&gt; </a:t>
+            </a:r>
+            <a:r>
+              <a:rPr lang="en-US" sz="7200" dirty="0" smtClean="0"/>
               <a:t>tag</a:t>
             </a:r>
-            <a:endParaRPr lang="en-US" sz="8800" dirty="0" smtClean="0"/>
+            <a:endParaRPr lang="en-US" sz="7200" dirty="0" smtClean="0">
+              <a:solidFill>
+                <a:srgbClr val="00B0F0"/>
+              </a:solidFill>
+            </a:endParaRPr>
+          </a:p>
+          <a:p>
+            <a:pPr algn="ctr"/>
+            <a:endParaRPr lang="en-US" sz="7200" dirty="0" smtClean="0">
+              <a:solidFill>
+                <a:srgbClr val="00B0F0"/>
+              </a:solidFill>
+            </a:endParaRPr>
+          </a:p>
+          <a:p>
+            <a:pPr algn="ctr"/>
+            <a:r>
+              <a:rPr lang="en-US" sz="7200" dirty="0" smtClean="0">
+                <a:solidFill>
+                  <a:srgbClr val="00B0F0"/>
+                </a:solidFill>
+              </a:rPr>
+              <a:t>dropdowns</a:t>
+            </a:r>
+          </a:p>
+          <a:p>
+            <a:pPr algn="ctr"/>
+            <a:r>
+              <a:rPr lang="en-US" sz="7200" dirty="0" err="1" smtClean="0">
+                <a:solidFill>
+                  <a:srgbClr val="00B0F0"/>
+                </a:solidFill>
+              </a:rPr>
+              <a:t>textarea</a:t>
+            </a:r>
+            <a:endParaRPr lang="en-US" sz="7200" dirty="0" smtClean="0">
+              <a:solidFill>
+                <a:srgbClr val="00B0F0"/>
+              </a:solidFill>
+            </a:endParaRPr>
           </a:p>
         </p:txBody>
       </p:sp>
     </p:spTree>
     <p:extLst>
       <p:ext uri="{BB962C8B-B14F-4D97-AF65-F5344CB8AC3E}">
-        <p14:creationId xmlns:p14="http://schemas.microsoft.com/office/powerpoint/2010/main" val="611064164"/>
+        <p14:creationId xmlns:p14="http://schemas.microsoft.com/office/powerpoint/2010/main" val="1960558092"/>
       </p:ext>
     </p:extLst>
   </p:cSld>
@@ -6999,7 +7067,244 @@
     </p:spTree>
     <p:extLst>
       <p:ext uri="{BB962C8B-B14F-4D97-AF65-F5344CB8AC3E}">
+        <p14:creationId xmlns:p14="http://schemas.microsoft.com/office/powerpoint/2010/main" val="372412916"/>
+      </p:ext>
+    </p:extLst>
+  </p:cSld>
+  <p:clrMapOvr>
+    <a:masterClrMapping/>
+  </p:clrMapOvr>
+  <p:timing>
+    <p:tnLst>
+      <p:par>
+        <p:cTn id="1" dur="indefinite" restart="never" nodeType="tmRoot"/>
+      </p:par>
+    </p:tnLst>
+  </p:timing>
+</p:sld>
+</file>
+
+<file path=ppt/slides/slide45.xml><?xml version="1.0" encoding="utf-8"?>
+<p:sld xmlns:a="http://schemas.openxmlformats.org/drawingml/2006/main" xmlns:r="http://schemas.openxmlformats.org/officeDocument/2006/relationships" xmlns:p="http://schemas.openxmlformats.org/presentationml/2006/main">
+  <p:cSld>
+    <p:spTree>
+      <p:nvGrpSpPr>
+        <p:cNvPr id="1" name=""/>
+        <p:cNvGrpSpPr/>
+        <p:nvPr/>
+      </p:nvGrpSpPr>
+      <p:grpSpPr>
+        <a:xfrm>
+          <a:off x="0" y="0"/>
+          <a:ext cx="0" cy="0"/>
+          <a:chOff x="0" y="0"/>
+          <a:chExt cx="0" cy="0"/>
+        </a:xfrm>
+      </p:grpSpPr>
+      <p:sp>
+        <p:nvSpPr>
+          <p:cNvPr id="4" name="TextBox 3"/>
+          <p:cNvSpPr txBox="1"/>
+          <p:nvPr/>
+        </p:nvSpPr>
+        <p:spPr>
+          <a:xfrm>
+            <a:off x="304800" y="2744450"/>
+            <a:ext cx="8534400" cy="1446550"/>
+          </a:xfrm>
+          <a:prstGeom prst="rect">
+            <a:avLst/>
+          </a:prstGeom>
+          <a:noFill/>
+        </p:spPr>
+        <p:txBody>
+          <a:bodyPr wrap="square" rtlCol="0">
+            <a:spAutoFit/>
+          </a:bodyPr>
+          <a:lstStyle/>
+          <a:p>
+            <a:pPr algn="ctr"/>
+            <a:r>
+              <a:rPr lang="en-US" sz="8800" dirty="0" smtClean="0"/>
+              <a:t>The </a:t>
+            </a:r>
+            <a:r>
+              <a:rPr lang="en-US" sz="8800" dirty="0" smtClean="0">
+                <a:solidFill>
+                  <a:srgbClr val="00B0F0"/>
+                </a:solidFill>
+              </a:rPr>
+              <a:t>&lt;label&gt; </a:t>
+            </a:r>
+            <a:r>
+              <a:rPr lang="en-US" sz="8800" dirty="0" smtClean="0"/>
+              <a:t>tag</a:t>
+            </a:r>
+          </a:p>
+        </p:txBody>
+      </p:sp>
+    </p:spTree>
+    <p:extLst>
+      <p:ext uri="{BB962C8B-B14F-4D97-AF65-F5344CB8AC3E}">
+        <p14:creationId xmlns:p14="http://schemas.microsoft.com/office/powerpoint/2010/main" val="611064164"/>
+      </p:ext>
+    </p:extLst>
+  </p:cSld>
+  <p:clrMapOvr>
+    <a:masterClrMapping/>
+  </p:clrMapOvr>
+  <p:timing>
+    <p:tnLst>
+      <p:par>
+        <p:cTn id="1" dur="indefinite" restart="never" nodeType="tmRoot"/>
+      </p:par>
+    </p:tnLst>
+  </p:timing>
+</p:sld>
+</file>
+
+<file path=ppt/slides/slide46.xml><?xml version="1.0" encoding="utf-8"?>
+<p:sld xmlns:a="http://schemas.openxmlformats.org/drawingml/2006/main" xmlns:r="http://schemas.openxmlformats.org/officeDocument/2006/relationships" xmlns:p="http://schemas.openxmlformats.org/presentationml/2006/main">
+  <p:cSld>
+    <p:spTree>
+      <p:nvGrpSpPr>
+        <p:cNvPr id="1" name=""/>
+        <p:cNvGrpSpPr/>
+        <p:nvPr/>
+      </p:nvGrpSpPr>
+      <p:grpSpPr>
+        <a:xfrm>
+          <a:off x="0" y="0"/>
+          <a:ext cx="0" cy="0"/>
+          <a:chOff x="0" y="0"/>
+          <a:chExt cx="0" cy="0"/>
+        </a:xfrm>
+      </p:grpSpPr>
+      <p:sp>
+        <p:nvSpPr>
+          <p:cNvPr id="4" name="TextBox 3"/>
+          <p:cNvSpPr txBox="1"/>
+          <p:nvPr/>
+        </p:nvSpPr>
+        <p:spPr>
+          <a:xfrm>
+            <a:off x="762000" y="2438400"/>
+            <a:ext cx="7620000" cy="1862048"/>
+          </a:xfrm>
+          <a:prstGeom prst="rect">
+            <a:avLst/>
+          </a:prstGeom>
+          <a:noFill/>
+        </p:spPr>
+        <p:txBody>
+          <a:bodyPr wrap="square" rtlCol="0">
+            <a:spAutoFit/>
+          </a:bodyPr>
+          <a:lstStyle/>
+          <a:p>
+            <a:pPr algn="ctr"/>
+            <a:r>
+              <a:rPr lang="en-US" sz="11500" dirty="0" smtClean="0">
+                <a:solidFill>
+                  <a:srgbClr val="FFFF00"/>
+                </a:solidFill>
+              </a:rPr>
+              <a:t>DEMO</a:t>
+            </a:r>
+            <a:endParaRPr lang="en-US" sz="4800" dirty="0" smtClean="0">
+              <a:solidFill>
+                <a:srgbClr val="FFFF00"/>
+              </a:solidFill>
+            </a:endParaRPr>
+          </a:p>
+        </p:txBody>
+      </p:sp>
+    </p:spTree>
+    <p:extLst>
+      <p:ext uri="{BB962C8B-B14F-4D97-AF65-F5344CB8AC3E}">
         <p14:creationId xmlns:p14="http://schemas.microsoft.com/office/powerpoint/2010/main" val="2709568036"/>
+      </p:ext>
+    </p:extLst>
+  </p:cSld>
+  <p:clrMapOvr>
+    <a:masterClrMapping/>
+  </p:clrMapOvr>
+  <p:timing>
+    <p:tnLst>
+      <p:par>
+        <p:cTn id="1" dur="indefinite" restart="never" nodeType="tmRoot"/>
+      </p:par>
+    </p:tnLst>
+  </p:timing>
+</p:sld>
+</file>
+
+<file path=ppt/slides/slide47.xml><?xml version="1.0" encoding="utf-8"?>
+<p:sld xmlns:a="http://schemas.openxmlformats.org/drawingml/2006/main" xmlns:r="http://schemas.openxmlformats.org/officeDocument/2006/relationships" xmlns:p="http://schemas.openxmlformats.org/presentationml/2006/main">
+  <p:cSld>
+    <p:spTree>
+      <p:nvGrpSpPr>
+        <p:cNvPr id="1" name=""/>
+        <p:cNvGrpSpPr/>
+        <p:nvPr/>
+      </p:nvGrpSpPr>
+      <p:grpSpPr>
+        <a:xfrm>
+          <a:off x="0" y="0"/>
+          <a:ext cx="0" cy="0"/>
+          <a:chOff x="0" y="0"/>
+          <a:chExt cx="0" cy="0"/>
+        </a:xfrm>
+      </p:grpSpPr>
+      <p:sp>
+        <p:nvSpPr>
+          <p:cNvPr id="4" name="TextBox 3"/>
+          <p:cNvSpPr txBox="1"/>
+          <p:nvPr/>
+        </p:nvSpPr>
+        <p:spPr>
+          <a:xfrm>
+            <a:off x="762000" y="2438400"/>
+            <a:ext cx="7620000" cy="1862048"/>
+          </a:xfrm>
+          <a:prstGeom prst="rect">
+            <a:avLst/>
+          </a:prstGeom>
+          <a:noFill/>
+        </p:spPr>
+        <p:txBody>
+          <a:bodyPr wrap="square" rtlCol="0">
+            <a:spAutoFit/>
+          </a:bodyPr>
+          <a:lstStyle/>
+          <a:p>
+            <a:pPr algn="ctr"/>
+            <a:r>
+              <a:rPr lang="en-US" sz="11500" dirty="0" smtClean="0">
+                <a:solidFill>
+                  <a:schemeClr val="accent2">
+                    <a:lumMod val="60000"/>
+                    <a:lumOff val="40000"/>
+                  </a:schemeClr>
+                </a:solidFill>
+              </a:rPr>
+              <a:t>Thank You!</a:t>
+            </a:r>
+            <a:endParaRPr lang="en-US" sz="4800" dirty="0" smtClean="0">
+              <a:solidFill>
+                <a:schemeClr val="accent2">
+                  <a:lumMod val="60000"/>
+                  <a:lumOff val="40000"/>
+                </a:schemeClr>
+              </a:solidFill>
+            </a:endParaRPr>
+          </a:p>
+        </p:txBody>
+      </p:sp>
+    </p:spTree>
+    <p:extLst>
+      <p:ext uri="{BB962C8B-B14F-4D97-AF65-F5344CB8AC3E}">
+        <p14:creationId xmlns:p14="http://schemas.microsoft.com/office/powerpoint/2010/main" val="4213305375"/>
       </p:ext>
     </p:extLst>
   </p:cSld>

</xml_diff>